<commit_message>
Update Presentacion Final (incompleta).pptx
</commit_message>
<xml_diff>
--- a/Material/Presentación/Presentacion Final (incompleta).pptx
+++ b/Material/Presentación/Presentacion Final (incompleta).pptx
@@ -27,10 +27,9 @@
     <p:sldId id="265" r:id="rId21"/>
     <p:sldId id="267" r:id="rId22"/>
     <p:sldId id="271" r:id="rId23"/>
-    <p:sldId id="273" r:id="rId24"/>
-    <p:sldId id="283" r:id="rId25"/>
-    <p:sldId id="274" r:id="rId26"/>
-    <p:sldId id="275" r:id="rId27"/>
+    <p:sldId id="283" r:id="rId24"/>
+    <p:sldId id="274" r:id="rId25"/>
+    <p:sldId id="275" r:id="rId26"/>
   </p:sldIdLst>
   <p:sldSz cx="10080625" cy="7559675"/>
   <p:notesSz cx="7559675" cy="10691813"/>
@@ -14574,112 +14573,6 @@
                 <a:latin typeface="Source Sans Pro Black"/>
                 <a:ea typeface="DejaVu Sans"/>
               </a:rPr>
-              <a:t>Ejemplo de Diagrama de Secuencia 1</a:t>
-            </a:r>
-            <a:endParaRPr lang="es-ES" sz="3200" b="0" strike="noStrike" spc="-1" dirty="0">
-              <a:latin typeface="Arial"/>
-            </a:endParaRPr>
-          </a:p>
-        </p:txBody>
-      </p:sp>
-      <p:pic>
-        <p:nvPicPr>
-          <p:cNvPr id="4" name="Imagen 3"/>
-          <p:cNvPicPr/>
-          <p:nvPr/>
-        </p:nvPicPr>
-        <p:blipFill>
-          <a:blip r:embed="rId2"/>
-          <a:stretch/>
-        </p:blipFill>
-        <p:spPr>
-          <a:xfrm>
-            <a:off x="847023" y="1432174"/>
-            <a:ext cx="8914419" cy="5421013"/>
-          </a:xfrm>
-          <a:prstGeom prst="rect">
-            <a:avLst/>
-          </a:prstGeom>
-          <a:ln>
-            <a:noFill/>
-          </a:ln>
-        </p:spPr>
-      </p:pic>
-    </p:spTree>
-  </p:cSld>
-  <p:clrMapOvr>
-    <a:masterClrMapping/>
-  </p:clrMapOvr>
-</p:sld>
-</file>
-
-<file path=ppt/slides/slide19.xml><?xml version="1.0" encoding="utf-8"?>
-<p:sld xmlns:a="http://schemas.openxmlformats.org/drawingml/2006/main" xmlns:r="http://schemas.openxmlformats.org/officeDocument/2006/relationships" xmlns:p="http://schemas.openxmlformats.org/presentationml/2006/main">
-  <p:cSld>
-    <p:spTree>
-      <p:nvGrpSpPr>
-        <p:cNvPr id="1" name=""/>
-        <p:cNvGrpSpPr/>
-        <p:nvPr/>
-      </p:nvGrpSpPr>
-      <p:grpSpPr>
-        <a:xfrm>
-          <a:off x="0" y="0"/>
-          <a:ext cx="0" cy="0"/>
-          <a:chOff x="0" y="0"/>
-          <a:chExt cx="0" cy="0"/>
-        </a:xfrm>
-      </p:grpSpPr>
-      <p:sp>
-        <p:nvSpPr>
-          <p:cNvPr id="333" name="CustomShape 1"/>
-          <p:cNvSpPr/>
-          <p:nvPr/>
-        </p:nvSpPr>
-        <p:spPr>
-          <a:xfrm>
-            <a:off x="360000" y="360000"/>
-            <a:ext cx="9358920" cy="898920"/>
-          </a:xfrm>
-          <a:prstGeom prst="rect">
-            <a:avLst/>
-          </a:prstGeom>
-          <a:noFill/>
-          <a:ln>
-            <a:noFill/>
-          </a:ln>
-        </p:spPr>
-        <p:style>
-          <a:lnRef idx="0">
-            <a:scrgbClr r="0" g="0" b="0"/>
-          </a:lnRef>
-          <a:fillRef idx="0">
-            <a:scrgbClr r="0" g="0" b="0"/>
-          </a:fillRef>
-          <a:effectRef idx="0">
-            <a:scrgbClr r="0" g="0" b="0"/>
-          </a:effectRef>
-          <a:fontRef idx="minor"/>
-        </p:style>
-        <p:txBody>
-          <a:bodyPr lIns="0" tIns="0" rIns="0" bIns="0" anchor="b">
-            <a:noAutofit/>
-          </a:bodyPr>
-          <a:lstStyle/>
-          <a:p>
-            <a:pPr>
-              <a:lnSpc>
-                <a:spcPct val="100000"/>
-              </a:lnSpc>
-            </a:pPr>
-            <a:r>
-              <a:rPr lang="es-ES" sz="3200" b="1" strike="noStrike" spc="-1" dirty="0">
-                <a:solidFill>
-                  <a:srgbClr val="FFFFFF"/>
-                </a:solidFill>
-                <a:latin typeface="Source Sans Pro Black"/>
-                <a:ea typeface="DejaVu Sans"/>
-              </a:rPr>
               <a:t>Ejemplo de Diagrama de Secuencia 2</a:t>
             </a:r>
             <a:endParaRPr lang="es-ES" sz="3200" b="0" strike="noStrike" spc="-1" dirty="0">
@@ -14737,256 +14630,7 @@
 </p:sld>
 </file>
 
-<file path=ppt/slides/slide2.xml><?xml version="1.0" encoding="utf-8"?>
-<p:sld xmlns:a="http://schemas.openxmlformats.org/drawingml/2006/main" xmlns:r="http://schemas.openxmlformats.org/officeDocument/2006/relationships" xmlns:p="http://schemas.openxmlformats.org/presentationml/2006/main">
-  <p:cSld>
-    <p:spTree>
-      <p:nvGrpSpPr>
-        <p:cNvPr id="1" name=""/>
-        <p:cNvGrpSpPr/>
-        <p:nvPr/>
-      </p:nvGrpSpPr>
-      <p:grpSpPr>
-        <a:xfrm>
-          <a:off x="0" y="0"/>
-          <a:ext cx="0" cy="0"/>
-          <a:chOff x="0" y="0"/>
-          <a:chExt cx="0" cy="0"/>
-        </a:xfrm>
-      </p:grpSpPr>
-      <p:sp>
-        <p:nvSpPr>
-          <p:cNvPr id="292" name="CustomShape 1"/>
-          <p:cNvSpPr/>
-          <p:nvPr/>
-        </p:nvSpPr>
-        <p:spPr>
-          <a:xfrm>
-            <a:off x="360000" y="360000"/>
-            <a:ext cx="9358920" cy="898920"/>
-          </a:xfrm>
-          <a:prstGeom prst="rect">
-            <a:avLst/>
-          </a:prstGeom>
-          <a:noFill/>
-          <a:ln>
-            <a:noFill/>
-          </a:ln>
-        </p:spPr>
-        <p:style>
-          <a:lnRef idx="0">
-            <a:scrgbClr r="0" g="0" b="0"/>
-          </a:lnRef>
-          <a:fillRef idx="0">
-            <a:scrgbClr r="0" g="0" b="0"/>
-          </a:fillRef>
-          <a:effectRef idx="0">
-            <a:scrgbClr r="0" g="0" b="0"/>
-          </a:effectRef>
-          <a:fontRef idx="minor"/>
-        </p:style>
-        <p:txBody>
-          <a:bodyPr lIns="0" tIns="0" rIns="0" bIns="0" anchor="b">
-            <a:noAutofit/>
-          </a:bodyPr>
-          <a:lstStyle/>
-          <a:p>
-            <a:pPr>
-              <a:lnSpc>
-                <a:spcPct val="100000"/>
-              </a:lnSpc>
-            </a:pPr>
-            <a:r>
-              <a:rPr lang="es-ES" sz="3200" b="1" strike="noStrike" spc="-1" dirty="0">
-                <a:solidFill>
-                  <a:srgbClr val="FFFFFF"/>
-                </a:solidFill>
-                <a:latin typeface="Source Sans Pro Black"/>
-                <a:ea typeface="DejaVu Sans"/>
-              </a:rPr>
-              <a:t>¿En que consiste el Sistema?</a:t>
-            </a:r>
-            <a:endParaRPr lang="es-ES" sz="3200" b="0" strike="noStrike" spc="-1" dirty="0">
-              <a:latin typeface="Arial"/>
-            </a:endParaRPr>
-          </a:p>
-        </p:txBody>
-      </p:sp>
-      <p:sp>
-        <p:nvSpPr>
-          <p:cNvPr id="293" name="CustomShape 2"/>
-          <p:cNvSpPr/>
-          <p:nvPr/>
-        </p:nvSpPr>
-        <p:spPr>
-          <a:xfrm>
-            <a:off x="360000" y="1728000"/>
-            <a:ext cx="9178920" cy="4678920"/>
-          </a:xfrm>
-          <a:prstGeom prst="rect">
-            <a:avLst/>
-          </a:prstGeom>
-          <a:noFill/>
-          <a:ln>
-            <a:noFill/>
-          </a:ln>
-        </p:spPr>
-        <p:style>
-          <a:lnRef idx="0">
-            <a:scrgbClr r="0" g="0" b="0"/>
-          </a:lnRef>
-          <a:fillRef idx="0">
-            <a:scrgbClr r="0" g="0" b="0"/>
-          </a:fillRef>
-          <a:effectRef idx="0">
-            <a:scrgbClr r="0" g="0" b="0"/>
-          </a:effectRef>
-          <a:fontRef idx="minor"/>
-        </p:style>
-        <p:txBody>
-          <a:bodyPr lIns="0" tIns="0" rIns="0" bIns="0">
-            <a:normAutofit/>
-          </a:bodyPr>
-          <a:lstStyle/>
-          <a:p>
-            <a:pPr>
-              <a:lnSpc>
-                <a:spcPct val="100000"/>
-              </a:lnSpc>
-              <a:spcAft>
-                <a:spcPts val="1142"/>
-              </a:spcAft>
-            </a:pPr>
-            <a:r>
-              <a:rPr lang="es-ES" sz="2400" b="1" strike="noStrike" spc="-1" dirty="0">
-                <a:solidFill>
-                  <a:srgbClr val="1C1C1C"/>
-                </a:solidFill>
-                <a:latin typeface="Source Sans Pro Semibold"/>
-                <a:ea typeface="DejaVu Sans"/>
-              </a:rPr>
-              <a:t> </a:t>
-            </a:r>
-            <a:endParaRPr lang="es-ES" sz="2400" b="0" strike="noStrike" spc="-1" dirty="0">
-              <a:latin typeface="Arial"/>
-            </a:endParaRPr>
-          </a:p>
-          <a:p>
-            <a:pPr marL="216000" indent="-215280">
-              <a:lnSpc>
-                <a:spcPct val="100000"/>
-              </a:lnSpc>
-              <a:spcAft>
-                <a:spcPts val="1142"/>
-              </a:spcAft>
-              <a:buClr>
-                <a:srgbClr val="000000"/>
-              </a:buClr>
-              <a:buSzPct val="45000"/>
-              <a:buFont typeface="Wingdings" charset="2"/>
-              <a:buChar char=""/>
-            </a:pPr>
-            <a:r>
-              <a:rPr lang="es-ES" sz="2400" b="1" spc="-1" dirty="0">
-                <a:solidFill>
-                  <a:srgbClr val="1C1C1C"/>
-                </a:solidFill>
-                <a:latin typeface="Source Sans Pro Semibold"/>
-              </a:rPr>
-              <a:t> Sistema dirigido a restaurantes, agilizando y modernizando el servicio prestado por los mismos</a:t>
-            </a:r>
-            <a:endParaRPr lang="es-ES" sz="2400" spc="-1" dirty="0"/>
-          </a:p>
-          <a:p>
-            <a:pPr>
-              <a:lnSpc>
-                <a:spcPct val="100000"/>
-              </a:lnSpc>
-              <a:spcAft>
-                <a:spcPts val="1142"/>
-              </a:spcAft>
-            </a:pPr>
-            <a:endParaRPr lang="es-ES" sz="2400" spc="-1" dirty="0"/>
-          </a:p>
-          <a:p>
-            <a:pPr marL="216000" indent="-215280">
-              <a:lnSpc>
-                <a:spcPct val="100000"/>
-              </a:lnSpc>
-              <a:spcAft>
-                <a:spcPts val="1142"/>
-              </a:spcAft>
-              <a:buClr>
-                <a:srgbClr val="000000"/>
-              </a:buClr>
-              <a:buSzPct val="45000"/>
-              <a:buFont typeface="Wingdings" charset="2"/>
-              <a:buChar char=""/>
-            </a:pPr>
-            <a:r>
-              <a:rPr lang="es-ES" sz="2400" b="1" spc="-1" dirty="0">
-                <a:solidFill>
-                  <a:srgbClr val="1C1C1C"/>
-                </a:solidFill>
-                <a:latin typeface="Source Sans Pro Semibold"/>
-              </a:rPr>
-              <a:t> Comandas digitales</a:t>
-            </a:r>
-            <a:endParaRPr lang="es-ES" sz="2400" spc="-1" dirty="0"/>
-          </a:p>
-          <a:p>
-            <a:pPr>
-              <a:lnSpc>
-                <a:spcPct val="100000"/>
-              </a:lnSpc>
-              <a:spcAft>
-                <a:spcPts val="1142"/>
-              </a:spcAft>
-            </a:pPr>
-            <a:endParaRPr lang="es-ES" sz="2400" spc="-1" dirty="0"/>
-          </a:p>
-          <a:p>
-            <a:pPr marL="216000" indent="-215280">
-              <a:lnSpc>
-                <a:spcPct val="100000"/>
-              </a:lnSpc>
-              <a:spcAft>
-                <a:spcPts val="1142"/>
-              </a:spcAft>
-              <a:buClr>
-                <a:srgbClr val="000000"/>
-              </a:buClr>
-              <a:buSzPct val="45000"/>
-              <a:buFont typeface="Wingdings" charset="2"/>
-              <a:buChar char=""/>
-            </a:pPr>
-            <a:r>
-              <a:rPr lang="es-ES" sz="2400" b="1" spc="-1" dirty="0">
-                <a:solidFill>
-                  <a:srgbClr val="1C1C1C"/>
-                </a:solidFill>
-                <a:latin typeface="Source Sans Pro Semibold"/>
-              </a:rPr>
-              <a:t> Servicio de gestión para el restaurante</a:t>
-            </a:r>
-            <a:endParaRPr lang="es-ES" sz="2400" spc="-1" dirty="0"/>
-          </a:p>
-        </p:txBody>
-      </p:sp>
-    </p:spTree>
-    <p:extLst>
-      <p:ext uri="{BB962C8B-B14F-4D97-AF65-F5344CB8AC3E}">
-        <p14:creationId xmlns:p14="http://schemas.microsoft.com/office/powerpoint/2010/main" val="3294745492"/>
-      </p:ext>
-    </p:extLst>
-  </p:cSld>
-  <p:clrMapOvr>
-    <a:masterClrMapping/>
-  </p:clrMapOvr>
-</p:sld>
-</file>
-
-<file path=ppt/slides/slide20.xml><?xml version="1.0" encoding="utf-8"?>
+<file path=ppt/slides/slide19.xml><?xml version="1.0" encoding="utf-8"?>
 <p:sld xmlns:a="http://schemas.openxmlformats.org/drawingml/2006/main" xmlns:r="http://schemas.openxmlformats.org/officeDocument/2006/relationships" xmlns:p="http://schemas.openxmlformats.org/presentationml/2006/main">
   <p:cSld>
     <p:spTree>
@@ -15041,7 +14685,256 @@
 </p:sld>
 </file>
 
-<file path=ppt/slides/slide21.xml><?xml version="1.0" encoding="utf-8"?>
+<file path=ppt/slides/slide2.xml><?xml version="1.0" encoding="utf-8"?>
+<p:sld xmlns:a="http://schemas.openxmlformats.org/drawingml/2006/main" xmlns:r="http://schemas.openxmlformats.org/officeDocument/2006/relationships" xmlns:p="http://schemas.openxmlformats.org/presentationml/2006/main">
+  <p:cSld>
+    <p:spTree>
+      <p:nvGrpSpPr>
+        <p:cNvPr id="1" name=""/>
+        <p:cNvGrpSpPr/>
+        <p:nvPr/>
+      </p:nvGrpSpPr>
+      <p:grpSpPr>
+        <a:xfrm>
+          <a:off x="0" y="0"/>
+          <a:ext cx="0" cy="0"/>
+          <a:chOff x="0" y="0"/>
+          <a:chExt cx="0" cy="0"/>
+        </a:xfrm>
+      </p:grpSpPr>
+      <p:sp>
+        <p:nvSpPr>
+          <p:cNvPr id="292" name="CustomShape 1"/>
+          <p:cNvSpPr/>
+          <p:nvPr/>
+        </p:nvSpPr>
+        <p:spPr>
+          <a:xfrm>
+            <a:off x="360000" y="360000"/>
+            <a:ext cx="9358920" cy="898920"/>
+          </a:xfrm>
+          <a:prstGeom prst="rect">
+            <a:avLst/>
+          </a:prstGeom>
+          <a:noFill/>
+          <a:ln>
+            <a:noFill/>
+          </a:ln>
+        </p:spPr>
+        <p:style>
+          <a:lnRef idx="0">
+            <a:scrgbClr r="0" g="0" b="0"/>
+          </a:lnRef>
+          <a:fillRef idx="0">
+            <a:scrgbClr r="0" g="0" b="0"/>
+          </a:fillRef>
+          <a:effectRef idx="0">
+            <a:scrgbClr r="0" g="0" b="0"/>
+          </a:effectRef>
+          <a:fontRef idx="minor"/>
+        </p:style>
+        <p:txBody>
+          <a:bodyPr lIns="0" tIns="0" rIns="0" bIns="0" anchor="b">
+            <a:noAutofit/>
+          </a:bodyPr>
+          <a:lstStyle/>
+          <a:p>
+            <a:pPr>
+              <a:lnSpc>
+                <a:spcPct val="100000"/>
+              </a:lnSpc>
+            </a:pPr>
+            <a:r>
+              <a:rPr lang="es-ES" sz="3200" b="1" strike="noStrike" spc="-1" dirty="0">
+                <a:solidFill>
+                  <a:srgbClr val="FFFFFF"/>
+                </a:solidFill>
+                <a:latin typeface="Source Sans Pro Black"/>
+                <a:ea typeface="DejaVu Sans"/>
+              </a:rPr>
+              <a:t>¿En que consiste el Sistema?</a:t>
+            </a:r>
+            <a:endParaRPr lang="es-ES" sz="3200" b="0" strike="noStrike" spc="-1" dirty="0">
+              <a:latin typeface="Arial"/>
+            </a:endParaRPr>
+          </a:p>
+        </p:txBody>
+      </p:sp>
+      <p:sp>
+        <p:nvSpPr>
+          <p:cNvPr id="293" name="CustomShape 2"/>
+          <p:cNvSpPr/>
+          <p:nvPr/>
+        </p:nvSpPr>
+        <p:spPr>
+          <a:xfrm>
+            <a:off x="360000" y="1728000"/>
+            <a:ext cx="9178920" cy="4678920"/>
+          </a:xfrm>
+          <a:prstGeom prst="rect">
+            <a:avLst/>
+          </a:prstGeom>
+          <a:noFill/>
+          <a:ln>
+            <a:noFill/>
+          </a:ln>
+        </p:spPr>
+        <p:style>
+          <a:lnRef idx="0">
+            <a:scrgbClr r="0" g="0" b="0"/>
+          </a:lnRef>
+          <a:fillRef idx="0">
+            <a:scrgbClr r="0" g="0" b="0"/>
+          </a:fillRef>
+          <a:effectRef idx="0">
+            <a:scrgbClr r="0" g="0" b="0"/>
+          </a:effectRef>
+          <a:fontRef idx="minor"/>
+        </p:style>
+        <p:txBody>
+          <a:bodyPr lIns="0" tIns="0" rIns="0" bIns="0">
+            <a:normAutofit/>
+          </a:bodyPr>
+          <a:lstStyle/>
+          <a:p>
+            <a:pPr>
+              <a:lnSpc>
+                <a:spcPct val="100000"/>
+              </a:lnSpc>
+              <a:spcAft>
+                <a:spcPts val="1142"/>
+              </a:spcAft>
+            </a:pPr>
+            <a:r>
+              <a:rPr lang="es-ES" sz="2400" b="1" strike="noStrike" spc="-1" dirty="0">
+                <a:solidFill>
+                  <a:srgbClr val="1C1C1C"/>
+                </a:solidFill>
+                <a:latin typeface="Source Sans Pro Semibold"/>
+                <a:ea typeface="DejaVu Sans"/>
+              </a:rPr>
+              <a:t> </a:t>
+            </a:r>
+            <a:endParaRPr lang="es-ES" sz="2400" b="0" strike="noStrike" spc="-1" dirty="0">
+              <a:latin typeface="Arial"/>
+            </a:endParaRPr>
+          </a:p>
+          <a:p>
+            <a:pPr marL="216000" indent="-215280">
+              <a:lnSpc>
+                <a:spcPct val="100000"/>
+              </a:lnSpc>
+              <a:spcAft>
+                <a:spcPts val="1142"/>
+              </a:spcAft>
+              <a:buClr>
+                <a:srgbClr val="000000"/>
+              </a:buClr>
+              <a:buSzPct val="45000"/>
+              <a:buFont typeface="Wingdings" charset="2"/>
+              <a:buChar char=""/>
+            </a:pPr>
+            <a:r>
+              <a:rPr lang="es-ES" sz="2400" b="1" spc="-1" dirty="0">
+                <a:solidFill>
+                  <a:srgbClr val="1C1C1C"/>
+                </a:solidFill>
+                <a:latin typeface="Source Sans Pro Semibold"/>
+              </a:rPr>
+              <a:t> Sistema dirigido a restaurantes, agilizando y modernizando el servicio prestado por los mismos</a:t>
+            </a:r>
+            <a:endParaRPr lang="es-ES" sz="2400" spc="-1" dirty="0"/>
+          </a:p>
+          <a:p>
+            <a:pPr>
+              <a:lnSpc>
+                <a:spcPct val="100000"/>
+              </a:lnSpc>
+              <a:spcAft>
+                <a:spcPts val="1142"/>
+              </a:spcAft>
+            </a:pPr>
+            <a:endParaRPr lang="es-ES" sz="2400" spc="-1" dirty="0"/>
+          </a:p>
+          <a:p>
+            <a:pPr marL="216000" indent="-215280">
+              <a:lnSpc>
+                <a:spcPct val="100000"/>
+              </a:lnSpc>
+              <a:spcAft>
+                <a:spcPts val="1142"/>
+              </a:spcAft>
+              <a:buClr>
+                <a:srgbClr val="000000"/>
+              </a:buClr>
+              <a:buSzPct val="45000"/>
+              <a:buFont typeface="Wingdings" charset="2"/>
+              <a:buChar char=""/>
+            </a:pPr>
+            <a:r>
+              <a:rPr lang="es-ES" sz="2400" b="1" spc="-1" dirty="0">
+                <a:solidFill>
+                  <a:srgbClr val="1C1C1C"/>
+                </a:solidFill>
+                <a:latin typeface="Source Sans Pro Semibold"/>
+              </a:rPr>
+              <a:t> Comandas digitales</a:t>
+            </a:r>
+            <a:endParaRPr lang="es-ES" sz="2400" spc="-1" dirty="0"/>
+          </a:p>
+          <a:p>
+            <a:pPr>
+              <a:lnSpc>
+                <a:spcPct val="100000"/>
+              </a:lnSpc>
+              <a:spcAft>
+                <a:spcPts val="1142"/>
+              </a:spcAft>
+            </a:pPr>
+            <a:endParaRPr lang="es-ES" sz="2400" spc="-1" dirty="0"/>
+          </a:p>
+          <a:p>
+            <a:pPr marL="216000" indent="-215280">
+              <a:lnSpc>
+                <a:spcPct val="100000"/>
+              </a:lnSpc>
+              <a:spcAft>
+                <a:spcPts val="1142"/>
+              </a:spcAft>
+              <a:buClr>
+                <a:srgbClr val="000000"/>
+              </a:buClr>
+              <a:buSzPct val="45000"/>
+              <a:buFont typeface="Wingdings" charset="2"/>
+              <a:buChar char=""/>
+            </a:pPr>
+            <a:r>
+              <a:rPr lang="es-ES" sz="2400" b="1" spc="-1" dirty="0">
+                <a:solidFill>
+                  <a:srgbClr val="1C1C1C"/>
+                </a:solidFill>
+                <a:latin typeface="Source Sans Pro Semibold"/>
+              </a:rPr>
+              <a:t> Servicio de gestión para el restaurante</a:t>
+            </a:r>
+            <a:endParaRPr lang="es-ES" sz="2400" spc="-1" dirty="0"/>
+          </a:p>
+        </p:txBody>
+      </p:sp>
+    </p:spTree>
+    <p:extLst>
+      <p:ext uri="{BB962C8B-B14F-4D97-AF65-F5344CB8AC3E}">
+        <p14:creationId xmlns:p14="http://schemas.microsoft.com/office/powerpoint/2010/main" val="3294745492"/>
+      </p:ext>
+    </p:extLst>
+  </p:cSld>
+  <p:clrMapOvr>
+    <a:masterClrMapping/>
+  </p:clrMapOvr>
+</p:sld>
+</file>
+
+<file path=ppt/slides/slide20.xml><?xml version="1.0" encoding="utf-8"?>
 <p:sld xmlns:a="http://schemas.openxmlformats.org/drawingml/2006/main" xmlns:r="http://schemas.openxmlformats.org/officeDocument/2006/relationships" xmlns:p="http://schemas.openxmlformats.org/presentationml/2006/main">
   <p:cSld>
     <p:spTree>

</xml_diff>